<commit_message>
Added Inkpath QR code for LIVE attendance
</commit_message>
<xml_diff>
--- a/Intro_to_Quant_Analysis_in_R_slides.pptx
+++ b/Intro_to_Quant_Analysis_in_R_slides.pptx
@@ -5,7 +5,7 @@
     <p:sldMasterId id="2147483648" r:id="rId1"/>
   </p:sldMasterIdLst>
   <p:notesMasterIdLst>
-    <p:notesMasterId r:id="rId9"/>
+    <p:notesMasterId r:id="rId10"/>
   </p:notesMasterIdLst>
   <p:sldIdLst>
     <p:sldId id="264" r:id="rId2"/>
@@ -15,6 +15,7 @@
     <p:sldId id="375" r:id="rId6"/>
     <p:sldId id="405" r:id="rId7"/>
     <p:sldId id="406" r:id="rId8"/>
+    <p:sldId id="407" r:id="rId9"/>
   </p:sldIdLst>
   <p:sldSz cx="12192000" cy="6858000"/>
   <p:notesSz cx="6858000" cy="9144000"/>
@@ -150,7 +151,7 @@
   <pc:docChgLst>
     <pc:chgData name="Korochkina, Maria" userId="c909cca0-0566-42e0-8dc0-791f330c8ce2" providerId="ADAL" clId="{97825DE4-A198-468F-898D-C5BD5F984618}"/>
     <pc:docChg chg="addSld modSld">
-      <pc:chgData name="Korochkina, Maria" userId="c909cca0-0566-42e0-8dc0-791f330c8ce2" providerId="ADAL" clId="{97825DE4-A198-468F-898D-C5BD5F984618}" dt="2025-10-14T15:26:21.156" v="8" actId="1076"/>
+      <pc:chgData name="Korochkina, Maria" userId="c909cca0-0566-42e0-8dc0-791f330c8ce2" providerId="ADAL" clId="{97825DE4-A198-468F-898D-C5BD5F984618}" dt="2025-10-29T17:52:43.544" v="10" actId="22"/>
       <pc:docMkLst>
         <pc:docMk/>
       </pc:docMkLst>
@@ -204,6 +205,21 @@
           <pc:sldMk cId="3564412488" sldId="405"/>
         </pc:sldMkLst>
       </pc:sldChg>
+      <pc:sldChg chg="addSp new mod">
+        <pc:chgData name="Korochkina, Maria" userId="c909cca0-0566-42e0-8dc0-791f330c8ce2" providerId="ADAL" clId="{97825DE4-A198-468F-898D-C5BD5F984618}" dt="2025-10-29T17:52:43.544" v="10" actId="22"/>
+        <pc:sldMkLst>
+          <pc:docMk/>
+          <pc:sldMk cId="805153903" sldId="407"/>
+        </pc:sldMkLst>
+        <pc:picChg chg="add">
+          <ac:chgData name="Korochkina, Maria" userId="c909cca0-0566-42e0-8dc0-791f330c8ce2" providerId="ADAL" clId="{97825DE4-A198-468F-898D-C5BD5F984618}" dt="2025-10-29T17:52:43.544" v="10" actId="22"/>
+          <ac:picMkLst>
+            <pc:docMk/>
+            <pc:sldMk cId="805153903" sldId="407"/>
+            <ac:picMk id="3" creationId="{82D9AAC2-F490-88D4-5300-046DFC060872}"/>
+          </ac:picMkLst>
+        </pc:picChg>
+      </pc:sldChg>
     </pc:docChg>
   </pc:docChgLst>
 </pc:chgInfo>
@@ -291,7 +307,7 @@
           <a:p>
             <a:fld id="{7A3364C9-7250-4855-80B8-891A1A7110D3}" type="datetimeFigureOut">
               <a:rPr lang="en-DE" smtClean="0"/>
-              <a:t>10/22/2025</a:t>
+              <a:t>29/10/2025</a:t>
             </a:fld>
             <a:endParaRPr lang="en-DE"/>
           </a:p>
@@ -990,7 +1006,7 @@
           <a:p>
             <a:fld id="{40EE97A1-DDF3-4DC9-9CBD-4CA243F15097}" type="datetimeFigureOut">
               <a:rPr lang="en-DE" smtClean="0"/>
-              <a:t>10/22/2025</a:t>
+              <a:t>29/10/2025</a:t>
             </a:fld>
             <a:endParaRPr lang="en-DE"/>
           </a:p>
@@ -1190,7 +1206,7 @@
           <a:p>
             <a:fld id="{40EE97A1-DDF3-4DC9-9CBD-4CA243F15097}" type="datetimeFigureOut">
               <a:rPr lang="en-DE" smtClean="0"/>
-              <a:t>10/22/2025</a:t>
+              <a:t>29/10/2025</a:t>
             </a:fld>
             <a:endParaRPr lang="en-DE"/>
           </a:p>
@@ -1400,7 +1416,7 @@
           <a:p>
             <a:fld id="{40EE97A1-DDF3-4DC9-9CBD-4CA243F15097}" type="datetimeFigureOut">
               <a:rPr lang="en-DE" smtClean="0"/>
-              <a:t>10/22/2025</a:t>
+              <a:t>29/10/2025</a:t>
             </a:fld>
             <a:endParaRPr lang="en-DE"/>
           </a:p>
@@ -1600,7 +1616,7 @@
           <a:p>
             <a:fld id="{40EE97A1-DDF3-4DC9-9CBD-4CA243F15097}" type="datetimeFigureOut">
               <a:rPr lang="en-DE" smtClean="0"/>
-              <a:t>10/22/2025</a:t>
+              <a:t>29/10/2025</a:t>
             </a:fld>
             <a:endParaRPr lang="en-DE"/>
           </a:p>
@@ -1876,7 +1892,7 @@
           <a:p>
             <a:fld id="{40EE97A1-DDF3-4DC9-9CBD-4CA243F15097}" type="datetimeFigureOut">
               <a:rPr lang="en-DE" smtClean="0"/>
-              <a:t>10/22/2025</a:t>
+              <a:t>29/10/2025</a:t>
             </a:fld>
             <a:endParaRPr lang="en-DE"/>
           </a:p>
@@ -2144,7 +2160,7 @@
           <a:p>
             <a:fld id="{40EE97A1-DDF3-4DC9-9CBD-4CA243F15097}" type="datetimeFigureOut">
               <a:rPr lang="en-DE" smtClean="0"/>
-              <a:t>10/22/2025</a:t>
+              <a:t>29/10/2025</a:t>
             </a:fld>
             <a:endParaRPr lang="en-DE"/>
           </a:p>
@@ -2559,7 +2575,7 @@
           <a:p>
             <a:fld id="{40EE97A1-DDF3-4DC9-9CBD-4CA243F15097}" type="datetimeFigureOut">
               <a:rPr lang="en-DE" smtClean="0"/>
-              <a:t>10/22/2025</a:t>
+              <a:t>29/10/2025</a:t>
             </a:fld>
             <a:endParaRPr lang="en-DE"/>
           </a:p>
@@ -2701,7 +2717,7 @@
           <a:p>
             <a:fld id="{40EE97A1-DDF3-4DC9-9CBD-4CA243F15097}" type="datetimeFigureOut">
               <a:rPr lang="en-DE" smtClean="0"/>
-              <a:t>10/22/2025</a:t>
+              <a:t>29/10/2025</a:t>
             </a:fld>
             <a:endParaRPr lang="en-DE"/>
           </a:p>
@@ -2814,7 +2830,7 @@
           <a:p>
             <a:fld id="{40EE97A1-DDF3-4DC9-9CBD-4CA243F15097}" type="datetimeFigureOut">
               <a:rPr lang="en-DE" smtClean="0"/>
-              <a:t>10/22/2025</a:t>
+              <a:t>29/10/2025</a:t>
             </a:fld>
             <a:endParaRPr lang="en-DE"/>
           </a:p>
@@ -3127,7 +3143,7 @@
           <a:p>
             <a:fld id="{40EE97A1-DDF3-4DC9-9CBD-4CA243F15097}" type="datetimeFigureOut">
               <a:rPr lang="en-DE" smtClean="0"/>
-              <a:t>10/22/2025</a:t>
+              <a:t>29/10/2025</a:t>
             </a:fld>
             <a:endParaRPr lang="en-DE"/>
           </a:p>
@@ -3416,7 +3432,7 @@
           <a:p>
             <a:fld id="{40EE97A1-DDF3-4DC9-9CBD-4CA243F15097}" type="datetimeFigureOut">
               <a:rPr lang="en-DE" smtClean="0"/>
-              <a:t>10/22/2025</a:t>
+              <a:t>29/10/2025</a:t>
             </a:fld>
             <a:endParaRPr lang="en-DE"/>
           </a:p>
@@ -3659,7 +3675,7 @@
           <a:p>
             <a:fld id="{40EE97A1-DDF3-4DC9-9CBD-4CA243F15097}" type="datetimeFigureOut">
               <a:rPr lang="en-DE" smtClean="0"/>
-              <a:t>10/22/2025</a:t>
+              <a:t>29/10/2025</a:t>
             </a:fld>
             <a:endParaRPr lang="en-DE"/>
           </a:p>
@@ -6066,6 +6082,66 @@
     <p:extLst>
       <p:ext uri="{BB962C8B-B14F-4D97-AF65-F5344CB8AC3E}">
         <p14:creationId xmlns:p14="http://schemas.microsoft.com/office/powerpoint/2010/main" val="1123849471"/>
+      </p:ext>
+    </p:extLst>
+  </p:cSld>
+  <p:clrMapOvr>
+    <a:masterClrMapping/>
+  </p:clrMapOvr>
+</p:sld>
+</file>
+
+<file path=ppt/slides/slide8.xml><?xml version="1.0" encoding="utf-8"?>
+<p:sld xmlns:a="http://schemas.openxmlformats.org/drawingml/2006/main" xmlns:r="http://schemas.openxmlformats.org/officeDocument/2006/relationships" xmlns:p="http://schemas.openxmlformats.org/presentationml/2006/main">
+  <p:cSld>
+    <p:spTree>
+      <p:nvGrpSpPr>
+        <p:cNvPr id="1" name=""/>
+        <p:cNvGrpSpPr/>
+        <p:nvPr/>
+      </p:nvGrpSpPr>
+      <p:grpSpPr>
+        <a:xfrm>
+          <a:off x="0" y="0"/>
+          <a:ext cx="0" cy="0"/>
+          <a:chOff x="0" y="0"/>
+          <a:chExt cx="0" cy="0"/>
+        </a:xfrm>
+      </p:grpSpPr>
+      <p:pic>
+        <p:nvPicPr>
+          <p:cNvPr id="3" name="Picture 2">
+            <a:extLst>
+              <a:ext uri="{FF2B5EF4-FFF2-40B4-BE49-F238E27FC236}">
+                <a16:creationId xmlns:a16="http://schemas.microsoft.com/office/drawing/2014/main" id="{82D9AAC2-F490-88D4-5300-046DFC060872}"/>
+              </a:ext>
+            </a:extLst>
+          </p:cNvPr>
+          <p:cNvPicPr>
+            <a:picLocks noChangeAspect="1"/>
+          </p:cNvPicPr>
+          <p:nvPr/>
+        </p:nvPicPr>
+        <p:blipFill>
+          <a:blip r:embed="rId2"/>
+          <a:stretch>
+            <a:fillRect/>
+          </a:stretch>
+        </p:blipFill>
+        <p:spPr>
+          <a:xfrm>
+            <a:off x="1170887" y="256732"/>
+            <a:ext cx="9850225" cy="6344535"/>
+          </a:xfrm>
+          <a:prstGeom prst="rect">
+            <a:avLst/>
+          </a:prstGeom>
+        </p:spPr>
+      </p:pic>
+    </p:spTree>
+    <p:extLst>
+      <p:ext uri="{BB962C8B-B14F-4D97-AF65-F5344CB8AC3E}">
+        <p14:creationId xmlns:p14="http://schemas.microsoft.com/office/powerpoint/2010/main" val="805153903"/>
       </p:ext>
     </p:extLst>
   </p:cSld>

</xml_diff>

<commit_message>
Removed InkPath QR code for the live session as advised by the SEDarc team
</commit_message>
<xml_diff>
--- a/Intro_to_Quant_Analysis_in_R_slides.pptx
+++ b/Intro_to_Quant_Analysis_in_R_slides.pptx
@@ -5,7 +5,7 @@
     <p:sldMasterId id="2147483648" r:id="rId1"/>
   </p:sldMasterIdLst>
   <p:notesMasterIdLst>
-    <p:notesMasterId r:id="rId10"/>
+    <p:notesMasterId r:id="rId9"/>
   </p:notesMasterIdLst>
   <p:sldIdLst>
     <p:sldId id="264" r:id="rId2"/>
@@ -15,7 +15,6 @@
     <p:sldId id="375" r:id="rId6"/>
     <p:sldId id="405" r:id="rId7"/>
     <p:sldId id="406" r:id="rId8"/>
-    <p:sldId id="407" r:id="rId9"/>
   </p:sldIdLst>
   <p:sldSz cx="12192000" cy="6858000"/>
   <p:notesSz cx="6858000" cy="9144000"/>
@@ -150,8 +149,8 @@
   </pc:docChgLst>
   <pc:docChgLst>
     <pc:chgData name="Korochkina, Maria" userId="c909cca0-0566-42e0-8dc0-791f330c8ce2" providerId="ADAL" clId="{97825DE4-A198-468F-898D-C5BD5F984618}"/>
-    <pc:docChg chg="addSld modSld">
-      <pc:chgData name="Korochkina, Maria" userId="c909cca0-0566-42e0-8dc0-791f330c8ce2" providerId="ADAL" clId="{97825DE4-A198-468F-898D-C5BD5F984618}" dt="2025-10-29T17:52:43.544" v="10" actId="22"/>
+    <pc:docChg chg="addSld delSld modSld">
+      <pc:chgData name="Korochkina, Maria" userId="c909cca0-0566-42e0-8dc0-791f330c8ce2" providerId="ADAL" clId="{97825DE4-A198-468F-898D-C5BD5F984618}" dt="2025-11-03T12:55:47.391" v="11" actId="47"/>
       <pc:docMkLst>
         <pc:docMk/>
       </pc:docMkLst>
@@ -205,20 +204,12 @@
           <pc:sldMk cId="3564412488" sldId="405"/>
         </pc:sldMkLst>
       </pc:sldChg>
-      <pc:sldChg chg="addSp new mod">
-        <pc:chgData name="Korochkina, Maria" userId="c909cca0-0566-42e0-8dc0-791f330c8ce2" providerId="ADAL" clId="{97825DE4-A198-468F-898D-C5BD5F984618}" dt="2025-10-29T17:52:43.544" v="10" actId="22"/>
+      <pc:sldChg chg="addSp new del mod">
+        <pc:chgData name="Korochkina, Maria" userId="c909cca0-0566-42e0-8dc0-791f330c8ce2" providerId="ADAL" clId="{97825DE4-A198-468F-898D-C5BD5F984618}" dt="2025-11-03T12:55:47.391" v="11" actId="47"/>
         <pc:sldMkLst>
           <pc:docMk/>
           <pc:sldMk cId="805153903" sldId="407"/>
         </pc:sldMkLst>
-        <pc:picChg chg="add">
-          <ac:chgData name="Korochkina, Maria" userId="c909cca0-0566-42e0-8dc0-791f330c8ce2" providerId="ADAL" clId="{97825DE4-A198-468F-898D-C5BD5F984618}" dt="2025-10-29T17:52:43.544" v="10" actId="22"/>
-          <ac:picMkLst>
-            <pc:docMk/>
-            <pc:sldMk cId="805153903" sldId="407"/>
-            <ac:picMk id="3" creationId="{82D9AAC2-F490-88D4-5300-046DFC060872}"/>
-          </ac:picMkLst>
-        </pc:picChg>
       </pc:sldChg>
     </pc:docChg>
   </pc:docChgLst>
@@ -307,7 +298,7 @@
           <a:p>
             <a:fld id="{7A3364C9-7250-4855-80B8-891A1A7110D3}" type="datetimeFigureOut">
               <a:rPr lang="en-DE" smtClean="0"/>
-              <a:t>29/10/2025</a:t>
+              <a:t>03/11/2025</a:t>
             </a:fld>
             <a:endParaRPr lang="en-DE"/>
           </a:p>
@@ -1006,7 +997,7 @@
           <a:p>
             <a:fld id="{40EE97A1-DDF3-4DC9-9CBD-4CA243F15097}" type="datetimeFigureOut">
               <a:rPr lang="en-DE" smtClean="0"/>
-              <a:t>29/10/2025</a:t>
+              <a:t>03/11/2025</a:t>
             </a:fld>
             <a:endParaRPr lang="en-DE"/>
           </a:p>
@@ -1206,7 +1197,7 @@
           <a:p>
             <a:fld id="{40EE97A1-DDF3-4DC9-9CBD-4CA243F15097}" type="datetimeFigureOut">
               <a:rPr lang="en-DE" smtClean="0"/>
-              <a:t>29/10/2025</a:t>
+              <a:t>03/11/2025</a:t>
             </a:fld>
             <a:endParaRPr lang="en-DE"/>
           </a:p>
@@ -1416,7 +1407,7 @@
           <a:p>
             <a:fld id="{40EE97A1-DDF3-4DC9-9CBD-4CA243F15097}" type="datetimeFigureOut">
               <a:rPr lang="en-DE" smtClean="0"/>
-              <a:t>29/10/2025</a:t>
+              <a:t>03/11/2025</a:t>
             </a:fld>
             <a:endParaRPr lang="en-DE"/>
           </a:p>
@@ -1616,7 +1607,7 @@
           <a:p>
             <a:fld id="{40EE97A1-DDF3-4DC9-9CBD-4CA243F15097}" type="datetimeFigureOut">
               <a:rPr lang="en-DE" smtClean="0"/>
-              <a:t>29/10/2025</a:t>
+              <a:t>03/11/2025</a:t>
             </a:fld>
             <a:endParaRPr lang="en-DE"/>
           </a:p>
@@ -1892,7 +1883,7 @@
           <a:p>
             <a:fld id="{40EE97A1-DDF3-4DC9-9CBD-4CA243F15097}" type="datetimeFigureOut">
               <a:rPr lang="en-DE" smtClean="0"/>
-              <a:t>29/10/2025</a:t>
+              <a:t>03/11/2025</a:t>
             </a:fld>
             <a:endParaRPr lang="en-DE"/>
           </a:p>
@@ -2160,7 +2151,7 @@
           <a:p>
             <a:fld id="{40EE97A1-DDF3-4DC9-9CBD-4CA243F15097}" type="datetimeFigureOut">
               <a:rPr lang="en-DE" smtClean="0"/>
-              <a:t>29/10/2025</a:t>
+              <a:t>03/11/2025</a:t>
             </a:fld>
             <a:endParaRPr lang="en-DE"/>
           </a:p>
@@ -2575,7 +2566,7 @@
           <a:p>
             <a:fld id="{40EE97A1-DDF3-4DC9-9CBD-4CA243F15097}" type="datetimeFigureOut">
               <a:rPr lang="en-DE" smtClean="0"/>
-              <a:t>29/10/2025</a:t>
+              <a:t>03/11/2025</a:t>
             </a:fld>
             <a:endParaRPr lang="en-DE"/>
           </a:p>
@@ -2717,7 +2708,7 @@
           <a:p>
             <a:fld id="{40EE97A1-DDF3-4DC9-9CBD-4CA243F15097}" type="datetimeFigureOut">
               <a:rPr lang="en-DE" smtClean="0"/>
-              <a:t>29/10/2025</a:t>
+              <a:t>03/11/2025</a:t>
             </a:fld>
             <a:endParaRPr lang="en-DE"/>
           </a:p>
@@ -2830,7 +2821,7 @@
           <a:p>
             <a:fld id="{40EE97A1-DDF3-4DC9-9CBD-4CA243F15097}" type="datetimeFigureOut">
               <a:rPr lang="en-DE" smtClean="0"/>
-              <a:t>29/10/2025</a:t>
+              <a:t>03/11/2025</a:t>
             </a:fld>
             <a:endParaRPr lang="en-DE"/>
           </a:p>
@@ -3143,7 +3134,7 @@
           <a:p>
             <a:fld id="{40EE97A1-DDF3-4DC9-9CBD-4CA243F15097}" type="datetimeFigureOut">
               <a:rPr lang="en-DE" smtClean="0"/>
-              <a:t>29/10/2025</a:t>
+              <a:t>03/11/2025</a:t>
             </a:fld>
             <a:endParaRPr lang="en-DE"/>
           </a:p>
@@ -3432,7 +3423,7 @@
           <a:p>
             <a:fld id="{40EE97A1-DDF3-4DC9-9CBD-4CA243F15097}" type="datetimeFigureOut">
               <a:rPr lang="en-DE" smtClean="0"/>
-              <a:t>29/10/2025</a:t>
+              <a:t>03/11/2025</a:t>
             </a:fld>
             <a:endParaRPr lang="en-DE"/>
           </a:p>
@@ -3675,7 +3666,7 @@
           <a:p>
             <a:fld id="{40EE97A1-DDF3-4DC9-9CBD-4CA243F15097}" type="datetimeFigureOut">
               <a:rPr lang="en-DE" smtClean="0"/>
-              <a:t>29/10/2025</a:t>
+              <a:t>03/11/2025</a:t>
             </a:fld>
             <a:endParaRPr lang="en-DE"/>
           </a:p>
@@ -6082,66 +6073,6 @@
     <p:extLst>
       <p:ext uri="{BB962C8B-B14F-4D97-AF65-F5344CB8AC3E}">
         <p14:creationId xmlns:p14="http://schemas.microsoft.com/office/powerpoint/2010/main" val="1123849471"/>
-      </p:ext>
-    </p:extLst>
-  </p:cSld>
-  <p:clrMapOvr>
-    <a:masterClrMapping/>
-  </p:clrMapOvr>
-</p:sld>
-</file>
-
-<file path=ppt/slides/slide8.xml><?xml version="1.0" encoding="utf-8"?>
-<p:sld xmlns:a="http://schemas.openxmlformats.org/drawingml/2006/main" xmlns:r="http://schemas.openxmlformats.org/officeDocument/2006/relationships" xmlns:p="http://schemas.openxmlformats.org/presentationml/2006/main">
-  <p:cSld>
-    <p:spTree>
-      <p:nvGrpSpPr>
-        <p:cNvPr id="1" name=""/>
-        <p:cNvGrpSpPr/>
-        <p:nvPr/>
-      </p:nvGrpSpPr>
-      <p:grpSpPr>
-        <a:xfrm>
-          <a:off x="0" y="0"/>
-          <a:ext cx="0" cy="0"/>
-          <a:chOff x="0" y="0"/>
-          <a:chExt cx="0" cy="0"/>
-        </a:xfrm>
-      </p:grpSpPr>
-      <p:pic>
-        <p:nvPicPr>
-          <p:cNvPr id="3" name="Picture 2">
-            <a:extLst>
-              <a:ext uri="{FF2B5EF4-FFF2-40B4-BE49-F238E27FC236}">
-                <a16:creationId xmlns:a16="http://schemas.microsoft.com/office/drawing/2014/main" id="{82D9AAC2-F490-88D4-5300-046DFC060872}"/>
-              </a:ext>
-            </a:extLst>
-          </p:cNvPr>
-          <p:cNvPicPr>
-            <a:picLocks noChangeAspect="1"/>
-          </p:cNvPicPr>
-          <p:nvPr/>
-        </p:nvPicPr>
-        <p:blipFill>
-          <a:blip r:embed="rId2"/>
-          <a:stretch>
-            <a:fillRect/>
-          </a:stretch>
-        </p:blipFill>
-        <p:spPr>
-          <a:xfrm>
-            <a:off x="1170887" y="256732"/>
-            <a:ext cx="9850225" cy="6344535"/>
-          </a:xfrm>
-          <a:prstGeom prst="rect">
-            <a:avLst/>
-          </a:prstGeom>
-        </p:spPr>
-      </p:pic>
-    </p:spTree>
-    <p:extLst>
-      <p:ext uri="{BB962C8B-B14F-4D97-AF65-F5344CB8AC3E}">
-        <p14:creationId xmlns:p14="http://schemas.microsoft.com/office/powerpoint/2010/main" val="805153903"/>
       </p:ext>
     </p:extLst>
   </p:cSld>

</xml_diff>